<commit_message>
Fix quicksort page and add limitation of n in the 3rd homework problem
</commit_message>
<xml_diff>
--- a/slides/lec3.pptx
+++ b/slides/lec3.pptx
@@ -5947,12 +5947,20 @@
           <a:lstStyle/>
           <a:p>
             <a:r>
+              <a:rPr lang="en-US" altLang="zh-CN" sz="2800" dirty="0">
+                <a:solidFill>
+                  <a:schemeClr val="bg1"/>
+                </a:solidFill>
+              </a:rPr>
+              <a:t>m</a:t>
+            </a:r>
+            <a:r>
               <a:rPr lang="en-US" altLang="zh-CN" sz="2800" dirty="0" smtClean="0">
                 <a:solidFill>
                   <a:schemeClr val="bg1"/>
                 </a:solidFill>
               </a:rPr>
-              <a:t>main</a:t>
+              <a:t>ain</a:t>
             </a:r>
             <a:r>
               <a:rPr lang="zh-CN" altLang="en-US" sz="2800" dirty="0" smtClean="0">
@@ -5960,7 +5968,7 @@
                   <a:schemeClr val="bg1"/>
                 </a:solidFill>
               </a:rPr>
-              <a:t>中执行地址</a:t>
+              <a:t>的第一行</a:t>
             </a:r>
             <a:endParaRPr lang="zh-CN" altLang="en-US" sz="2800" dirty="0">
               <a:solidFill>
@@ -5983,6 +5991,13 @@
   <p:transition>
     <p:fade/>
   </p:transition>
+  <p:timing>
+    <p:tnLst>
+      <p:par>
+        <p:cTn id="1" dur="indefinite" restart="never" nodeType="tmRoot"/>
+      </p:par>
+    </p:tnLst>
+  </p:timing>
 </p:sld>
 </file>
 
@@ -6558,6 +6573,13 @@
   <p:transition>
     <p:fade/>
   </p:transition>
+  <p:timing>
+    <p:tnLst>
+      <p:par>
+        <p:cTn id="1" dur="indefinite" restart="never" nodeType="tmRoot"/>
+      </p:par>
+    </p:tnLst>
+  </p:timing>
 </p:sld>
 </file>
 
@@ -6657,6 +6679,13 @@
   <p:transition>
     <p:fade/>
   </p:transition>
+  <p:timing>
+    <p:tnLst>
+      <p:par>
+        <p:cTn id="1" dur="indefinite" restart="never" nodeType="tmRoot"/>
+      </p:par>
+    </p:tnLst>
+  </p:timing>
 </p:sld>
 </file>
 
@@ -6971,6 +7000,13 @@
   <p:transition>
     <p:fade/>
   </p:transition>
+  <p:timing>
+    <p:tnLst>
+      <p:par>
+        <p:cTn id="1" dur="indefinite" restart="never" nodeType="tmRoot"/>
+      </p:par>
+    </p:tnLst>
+  </p:timing>
 </p:sld>
 </file>
 
@@ -7205,6 +7241,13 @@
   <p:transition>
     <p:fade/>
   </p:transition>
+  <p:timing>
+    <p:tnLst>
+      <p:par>
+        <p:cTn id="1" dur="indefinite" restart="never" nodeType="tmRoot"/>
+      </p:par>
+    </p:tnLst>
+  </p:timing>
 </p:sld>
 </file>
 
@@ -7284,6 +7327,13 @@
   <p:transition>
     <p:fade/>
   </p:transition>
+  <p:timing>
+    <p:tnLst>
+      <p:par>
+        <p:cTn id="1" dur="indefinite" restart="never" nodeType="tmRoot"/>
+      </p:par>
+    </p:tnLst>
+  </p:timing>
 </p:sld>
 </file>
 
@@ -7383,6 +7433,13 @@
   <p:transition>
     <p:fade/>
   </p:transition>
+  <p:timing>
+    <p:tnLst>
+      <p:par>
+        <p:cTn id="1" dur="indefinite" restart="never" nodeType="tmRoot"/>
+      </p:par>
+    </p:tnLst>
+  </p:timing>
 </p:sld>
 </file>
 
@@ -7545,6 +7602,13 @@
   <p:transition>
     <p:fade/>
   </p:transition>
+  <p:timing>
+    <p:tnLst>
+      <p:par>
+        <p:cTn id="1" dur="indefinite" restart="never" nodeType="tmRoot"/>
+      </p:par>
+    </p:tnLst>
+  </p:timing>
 </p:sld>
 </file>
 
@@ -7692,6 +7756,13 @@
   <p:transition>
     <p:fade/>
   </p:transition>
+  <p:timing>
+    <p:tnLst>
+      <p:par>
+        <p:cTn id="1" dur="indefinite" restart="never" nodeType="tmRoot"/>
+      </p:par>
+    </p:tnLst>
+  </p:timing>
 </p:sld>
 </file>
 
@@ -7787,6 +7858,13 @@
   <p:transition>
     <p:fade/>
   </p:transition>
+  <p:timing>
+    <p:tnLst>
+      <p:par>
+        <p:cTn id="1" dur="indefinite" restart="never" nodeType="tmRoot"/>
+      </p:par>
+    </p:tnLst>
+  </p:timing>
 </p:sld>
 </file>
 
@@ -8345,6 +8423,13 @@
   <p:transition>
     <p:fade/>
   </p:transition>
+  <p:timing>
+    <p:tnLst>
+      <p:par>
+        <p:cTn id="1" dur="indefinite" restart="never" nodeType="tmRoot"/>
+      </p:par>
+    </p:tnLst>
+  </p:timing>
 </p:sld>
 </file>
 
@@ -8616,6 +8701,13 @@
   <p:transition>
     <p:fade/>
   </p:transition>
+  <p:timing>
+    <p:tnLst>
+      <p:par>
+        <p:cTn id="1" dur="indefinite" restart="never" nodeType="tmRoot"/>
+      </p:par>
+    </p:tnLst>
+  </p:timing>
 </p:sld>
 </file>
 
@@ -8802,6 +8894,13 @@
   <p:transition>
     <p:fade/>
   </p:transition>
+  <p:timing>
+    <p:tnLst>
+      <p:par>
+        <p:cTn id="1" dur="indefinite" restart="never" nodeType="tmRoot"/>
+      </p:par>
+    </p:tnLst>
+  </p:timing>
 </p:sld>
 </file>
 
@@ -8948,6 +9047,13 @@
   <p:transition>
     <p:fade/>
   </p:transition>
+  <p:timing>
+    <p:tnLst>
+      <p:par>
+        <p:cTn id="1" dur="indefinite" restart="never" nodeType="tmRoot"/>
+      </p:par>
+    </p:tnLst>
+  </p:timing>
 </p:sld>
 </file>
 
@@ -9115,6 +9221,13 @@
   <p:transition>
     <p:fade/>
   </p:transition>
+  <p:timing>
+    <p:tnLst>
+      <p:par>
+        <p:cTn id="1" dur="indefinite" restart="never" nodeType="tmRoot"/>
+      </p:par>
+    </p:tnLst>
+  </p:timing>
 </p:sld>
 </file>
 
@@ -9280,6 +9393,13 @@
   <p:transition>
     <p:fade/>
   </p:transition>
+  <p:timing>
+    <p:tnLst>
+      <p:par>
+        <p:cTn id="1" dur="indefinite" restart="never" nodeType="tmRoot"/>
+      </p:par>
+    </p:tnLst>
+  </p:timing>
 </p:sld>
 </file>
 
@@ -9417,6 +9537,13 @@
   <p:transition>
     <p:fade/>
   </p:transition>
+  <p:timing>
+    <p:tnLst>
+      <p:par>
+        <p:cTn id="1" dur="indefinite" restart="never" nodeType="tmRoot"/>
+      </p:par>
+    </p:tnLst>
+  </p:timing>
 </p:sld>
 </file>
 
@@ -9518,6 +9645,13 @@
   <p:transition>
     <p:fade/>
   </p:transition>
+  <p:timing>
+    <p:tnLst>
+      <p:par>
+        <p:cTn id="1" dur="indefinite" restart="never" nodeType="tmRoot"/>
+      </p:par>
+    </p:tnLst>
+  </p:timing>
 </p:sld>
 </file>
 
@@ -9880,6 +10014,13 @@
   <p:transition>
     <p:fade/>
   </p:transition>
+  <p:timing>
+    <p:tnLst>
+      <p:par>
+        <p:cTn id="1" dur="indefinite" restart="never" nodeType="tmRoot"/>
+      </p:par>
+    </p:tnLst>
+  </p:timing>
 </p:sld>
 </file>
 
@@ -10003,6 +10144,13 @@
   <p:transition>
     <p:fade/>
   </p:transition>
+  <p:timing>
+    <p:tnLst>
+      <p:par>
+        <p:cTn id="1" dur="indefinite" restart="never" nodeType="tmRoot"/>
+      </p:par>
+    </p:tnLst>
+  </p:timing>
 </p:sld>
 </file>
 
@@ -10311,6 +10459,13 @@
   <p:transition>
     <p:fade/>
   </p:transition>
+  <p:timing>
+    <p:tnLst>
+      <p:par>
+        <p:cTn id="1" dur="indefinite" restart="never" nodeType="tmRoot"/>
+      </p:par>
+    </p:tnLst>
+  </p:timing>
 </p:sld>
 </file>
 
@@ -10362,8 +10517,8 @@
         </p:nvSpPr>
         <p:spPr>
           <a:xfrm>
-            <a:off x="519248" y="1758885"/>
-            <a:ext cx="11151916" cy="4819781"/>
+            <a:off x="519248" y="1490221"/>
+            <a:ext cx="11151916" cy="5429179"/>
           </a:xfrm>
         </p:spPr>
         <p:txBody>
@@ -10372,7 +10527,11 @@
           <a:p>
             <a:r>
               <a:rPr lang="en-US" altLang="zh-CN" sz="1800" dirty="0" smtClean="0"/>
-              <a:t>	quicksort(</a:t>
+              <a:t>	</a:t>
+            </a:r>
+            <a:r>
+              <a:rPr lang="en-US" altLang="zh-CN" sz="1800" dirty="0" smtClean="0"/>
+              <a:t>void quicksort(</a:t>
             </a:r>
             <a:r>
               <a:rPr lang="en-US" altLang="zh-CN" sz="1800" dirty="0" err="1" smtClean="0"/>
@@ -10380,7 +10539,11 @@
             </a:r>
             <a:r>
               <a:rPr lang="en-US" altLang="zh-CN" sz="1800" dirty="0" smtClean="0"/>
-              <a:t> l, </a:t>
+              <a:t> </a:t>
+            </a:r>
+            <a:r>
+              <a:rPr lang="en-US" altLang="zh-CN" sz="1800" dirty="0" smtClean="0"/>
+              <a:t>l, </a:t>
             </a:r>
             <a:r>
               <a:rPr lang="en-US" altLang="zh-CN" sz="1800" dirty="0" err="1" smtClean="0"/>
@@ -10388,8 +10551,33 @@
             </a:r>
             <a:r>
               <a:rPr lang="en-US" altLang="zh-CN" sz="1800" dirty="0" smtClean="0"/>
-              <a:t> r){</a:t>
-            </a:r>
+              <a:t> r</a:t>
+            </a:r>
+            <a:r>
+              <a:rPr lang="en-US" altLang="zh-CN" sz="1800" dirty="0" smtClean="0"/>
+              <a:t>){</a:t>
+            </a:r>
+          </a:p>
+          <a:p>
+            <a:r>
+              <a:rPr lang="en-US" altLang="zh-CN" sz="1800" dirty="0"/>
+              <a:t>	</a:t>
+            </a:r>
+            <a:r>
+              <a:rPr lang="en-US" altLang="zh-CN" sz="1800" dirty="0" smtClean="0"/>
+              <a:t>	if(r &lt;= l)</a:t>
+            </a:r>
+          </a:p>
+          <a:p>
+            <a:r>
+              <a:rPr lang="en-US" altLang="zh-CN" sz="1800" dirty="0"/>
+              <a:t>	</a:t>
+            </a:r>
+            <a:r>
+              <a:rPr lang="en-US" altLang="zh-CN" sz="1800" dirty="0" smtClean="0"/>
+              <a:t>		return;</a:t>
+            </a:r>
+            <a:endParaRPr lang="en-US" altLang="zh-CN" sz="1800" dirty="0" smtClean="0"/>
           </a:p>
           <a:p>
             <a:r>
@@ -10666,6 +10854,13 @@
   <p:transition>
     <p:fade/>
   </p:transition>
+  <p:timing>
+    <p:tnLst>
+      <p:par>
+        <p:cTn id="1" dur="indefinite" restart="never" nodeType="tmRoot"/>
+      </p:par>
+    </p:tnLst>
+  </p:timing>
 </p:sld>
 </file>
 
@@ -10726,7 +10921,7 @@
         <p:spPr>
           <a:xfrm>
             <a:off x="519248" y="1714500"/>
-            <a:ext cx="11151916" cy="2099036"/>
+            <a:ext cx="11151916" cy="2843855"/>
           </a:xfrm>
         </p:spPr>
         <p:txBody>
@@ -10749,7 +10944,30 @@
           <a:p>
             <a:r>
               <a:rPr lang="zh-CN" altLang="en-US" dirty="0" smtClean="0"/>
-              <a:t>输出一行，一个浮点数，本息和</a:t>
+              <a:t>输出一行，一个浮点数，本息</a:t>
+            </a:r>
+            <a:r>
+              <a:rPr lang="zh-CN" altLang="en-US" dirty="0" smtClean="0"/>
+              <a:t>和</a:t>
+            </a:r>
+            <a:endParaRPr lang="en-US" altLang="zh-CN" dirty="0" smtClean="0"/>
+          </a:p>
+          <a:p>
+            <a:r>
+              <a:rPr lang="zh-CN" altLang="en-US" dirty="0" smtClean="0"/>
+              <a:t>注：如年利率</a:t>
+            </a:r>
+            <a:r>
+              <a:rPr lang="en-US" altLang="zh-CN" dirty="0" smtClean="0"/>
+              <a:t>2%</a:t>
+            </a:r>
+            <a:r>
+              <a:rPr lang="zh-CN" altLang="en-US" dirty="0" smtClean="0"/>
+              <a:t>，则输入为</a:t>
+            </a:r>
+            <a:r>
+              <a:rPr lang="en-US" altLang="zh-CN" dirty="0" smtClean="0"/>
+              <a:t>0.02</a:t>
             </a:r>
             <a:endParaRPr lang="zh-CN" altLang="en-US" dirty="0"/>
           </a:p>
@@ -10768,6 +10986,13 @@
   <p:transition>
     <p:fade/>
   </p:transition>
+  <p:timing>
+    <p:tnLst>
+      <p:par>
+        <p:cTn id="1" dur="indefinite" restart="never" nodeType="tmRoot"/>
+      </p:par>
+    </p:tnLst>
+  </p:timing>
 </p:sld>
 </file>
 
@@ -10874,6 +11099,13 @@
   <p:transition>
     <p:fade/>
   </p:transition>
+  <p:timing>
+    <p:tnLst>
+      <p:par>
+        <p:cTn id="1" dur="indefinite" restart="never" nodeType="tmRoot"/>
+      </p:par>
+    </p:tnLst>
+  </p:timing>
 </p:sld>
 </file>
 
@@ -10982,6 +11214,30 @@
             <a:endParaRPr lang="en-US" altLang="zh-CN" dirty="0" smtClean="0"/>
           </a:p>
           <a:p>
+            <a:r>
+              <a:rPr lang="en-US" altLang="zh-CN" dirty="0" smtClean="0"/>
+              <a:t>n</a:t>
+            </a:r>
+            <a:r>
+              <a:rPr lang="zh-CN" altLang="en-US" dirty="0" smtClean="0"/>
+              <a:t>不超过</a:t>
+            </a:r>
+            <a:r>
+              <a:rPr lang="en-US" altLang="zh-CN" dirty="0" smtClean="0"/>
+              <a:t>100</a:t>
+            </a:r>
+            <a:r>
+              <a:rPr lang="zh-CN" altLang="en-US" dirty="0" smtClean="0"/>
+              <a:t>，每个单词长度不超过</a:t>
+            </a:r>
+            <a:r>
+              <a:rPr lang="en-US" altLang="zh-CN" dirty="0" smtClean="0"/>
+              <a:t>30</a:t>
+            </a:r>
+            <a:r>
+              <a:rPr lang="zh-CN" altLang="en-US" dirty="0"/>
+              <a:t>字符</a:t>
+            </a:r>
             <a:endParaRPr lang="en-US" altLang="zh-CN" dirty="0"/>
           </a:p>
           <a:p>
@@ -11178,6 +11434,72 @@
           </a:p>
         </p:txBody>
       </p:sp>
+      <p:sp>
+        <p:nvSpPr>
+          <p:cNvPr id="2" name="文本框 1"/>
+          <p:cNvSpPr txBox="1"/>
+          <p:nvPr/>
+        </p:nvSpPr>
+        <p:spPr>
+          <a:xfrm>
+            <a:off x="4166646" y="1352746"/>
+            <a:ext cx="7480169" cy="2246769"/>
+          </a:xfrm>
+          <a:prstGeom prst="rect">
+            <a:avLst/>
+          </a:prstGeom>
+          <a:noFill/>
+        </p:spPr>
+        <p:txBody>
+          <a:bodyPr wrap="square" rtlCol="0">
+            <a:spAutoFit/>
+          </a:bodyPr>
+          <a:lstStyle/>
+          <a:p>
+            <a:r>
+              <a:rPr lang="en-US" altLang="zh-CN" sz="2800" dirty="0" smtClean="0">
+                <a:solidFill>
+                  <a:schemeClr val="bg1"/>
+                </a:solidFill>
+              </a:rPr>
+              <a:t>story(){</a:t>
+            </a:r>
+          </a:p>
+          <a:p>
+            <a:r>
+              <a:rPr lang="en-US" altLang="zh-CN" sz="2800" dirty="0">
+                <a:solidFill>
+                  <a:schemeClr val="bg1"/>
+                </a:solidFill>
+              </a:rPr>
+              <a:t>	</a:t>
+            </a:r>
+            <a:r>
+              <a:rPr lang="en-US" altLang="zh-CN" sz="2800" dirty="0" smtClean="0">
+                <a:solidFill>
+                  <a:schemeClr val="bg1"/>
+                </a:solidFill>
+              </a:rPr>
+              <a:t>There was a temple on a hill. Inside temple there were two monks. The old monk was telling a story. The story was: story()</a:t>
+            </a:r>
+          </a:p>
+          <a:p>
+            <a:r>
+              <a:rPr lang="en-US" altLang="zh-CN" sz="2800" dirty="0" smtClean="0">
+                <a:solidFill>
+                  <a:schemeClr val="bg1"/>
+                </a:solidFill>
+              </a:rPr>
+              <a:t>}</a:t>
+            </a:r>
+            <a:endParaRPr lang="zh-CN" altLang="en-US" sz="2800" dirty="0">
+              <a:solidFill>
+                <a:schemeClr val="bg1"/>
+              </a:solidFill>
+            </a:endParaRPr>
+          </a:p>
+        </p:txBody>
+      </p:sp>
     </p:spTree>
     <p:extLst>
       <p:ext uri="{BB962C8B-B14F-4D97-AF65-F5344CB8AC3E}">
@@ -11191,6 +11513,13 @@
   <p:transition>
     <p:fade/>
   </p:transition>
+  <p:timing>
+    <p:tnLst>
+      <p:par>
+        <p:cTn id="1" dur="indefinite" restart="never" nodeType="tmRoot"/>
+      </p:par>
+    </p:tnLst>
+  </p:timing>
 </p:sld>
 </file>
 
@@ -11279,6 +11608,13 @@
   <p:transition>
     <p:fade/>
   </p:transition>
+  <p:timing>
+    <p:tnLst>
+      <p:par>
+        <p:cTn id="1" dur="indefinite" restart="never" nodeType="tmRoot"/>
+      </p:par>
+    </p:tnLst>
+  </p:timing>
 </p:sld>
 </file>
 
@@ -11461,6 +11797,13 @@
   <p:transition>
     <p:fade/>
   </p:transition>
+  <p:timing>
+    <p:tnLst>
+      <p:par>
+        <p:cTn id="1" dur="indefinite" restart="never" nodeType="tmRoot"/>
+      </p:par>
+    </p:tnLst>
+  </p:timing>
 </p:sld>
 </file>
 

</xml_diff>